<commit_message>
Some edits on IDW slides
</commit_message>
<xml_diff>
--- a/06.Presentation/A3vedioA42_to Present.pptx
+++ b/06.Presentation/A3vedioA42_to Present.pptx
@@ -23432,7 +23432,97 @@
           <a:p>
             <a:pPr algn="just"/>
             <a:r>
+              <a:rPr lang="en-US" sz="1800" kern="100" spc="-10" dirty="0">
+                <a:effectLst/>
+                <a:latin typeface="Arial Narrow" panose="020B0604020202020204" pitchFamily="34" charset="0"/>
+                <a:ea typeface="Aptos" panose="020B0004020202020204" pitchFamily="34" charset="0"/>
+                <a:cs typeface="Times New Roman" panose="02020603050405020304" pitchFamily="18" charset="0"/>
+              </a:rPr>
+              <a:t>Good day, mt name is Isabel de Waal, and I will be discussing the results </a:t>
+            </a:r>
+            <a:r>
+              <a:rPr lang="en-US" sz="1800" kern="100" spc="-10" dirty="0" err="1">
+                <a:effectLst/>
+                <a:latin typeface="Arial Narrow" panose="020B0604020202020204" pitchFamily="34" charset="0"/>
+                <a:ea typeface="Aptos" panose="020B0004020202020204" pitchFamily="34" charset="0"/>
+                <a:cs typeface="Times New Roman" panose="02020603050405020304" pitchFamily="18" charset="0"/>
+              </a:rPr>
+              <a:t>Keba</a:t>
+            </a:r>
+            <a:r>
+              <a:rPr lang="en-US" sz="1800" kern="100" spc="-10" dirty="0">
+                <a:effectLst/>
+                <a:latin typeface="Arial Narrow" panose="020B0604020202020204" pitchFamily="34" charset="0"/>
+                <a:ea typeface="Aptos" panose="020B0004020202020204" pitchFamily="34" charset="0"/>
+                <a:cs typeface="Times New Roman" panose="02020603050405020304" pitchFamily="18" charset="0"/>
+              </a:rPr>
+              <a:t> and </a:t>
+            </a:r>
+            <a:r>
+              <a:rPr lang="en-US" sz="1800" kern="100" spc="-10" dirty="0" err="1">
+                <a:effectLst/>
+                <a:latin typeface="Arial Narrow" panose="020B0604020202020204" pitchFamily="34" charset="0"/>
+                <a:ea typeface="Aptos" panose="020B0004020202020204" pitchFamily="34" charset="0"/>
+                <a:cs typeface="Times New Roman" panose="02020603050405020304" pitchFamily="18" charset="0"/>
+              </a:rPr>
+              <a:t>Sarel</a:t>
+            </a:r>
+            <a:r>
+              <a:rPr lang="en-US" sz="1800" kern="100" spc="-10" dirty="0">
+                <a:effectLst/>
+                <a:latin typeface="Arial Narrow" panose="020B0604020202020204" pitchFamily="34" charset="0"/>
+                <a:ea typeface="Aptos" panose="020B0004020202020204" pitchFamily="34" charset="0"/>
+                <a:cs typeface="Times New Roman" panose="02020603050405020304" pitchFamily="18" charset="0"/>
+              </a:rPr>
+              <a:t> </a:t>
+            </a:r>
+            <a:r>
               <a:rPr lang="en-US" sz="1800" kern="100" spc="-10">
+                <a:effectLst/>
+                <a:latin typeface="Arial Narrow" panose="020B0604020202020204" pitchFamily="34" charset="0"/>
+                <a:ea typeface="Aptos" panose="020B0004020202020204" pitchFamily="34" charset="0"/>
+                <a:cs typeface="Times New Roman" panose="02020603050405020304" pitchFamily="18" charset="0"/>
+              </a:rPr>
+              <a:t>just explained </a:t>
+            </a:r>
+            <a:r>
+              <a:rPr lang="en-US" sz="1800" kern="100" spc="-10" dirty="0">
+                <a:effectLst/>
+                <a:latin typeface="Arial Narrow" panose="020B0604020202020204" pitchFamily="34" charset="0"/>
+                <a:ea typeface="Aptos" panose="020B0004020202020204" pitchFamily="34" charset="0"/>
+                <a:cs typeface="Times New Roman" panose="02020603050405020304" pitchFamily="18" charset="0"/>
+              </a:rPr>
+              <a:t>in context </a:t>
+            </a:r>
+            <a:r>
+              <a:rPr lang="en-US" sz="1800" kern="100" spc="-10">
+                <a:effectLst/>
+                <a:latin typeface="Arial Narrow" panose="020B0604020202020204" pitchFamily="34" charset="0"/>
+                <a:ea typeface="Aptos" panose="020B0004020202020204" pitchFamily="34" charset="0"/>
+                <a:cs typeface="Times New Roman" panose="02020603050405020304" pitchFamily="18" charset="0"/>
+              </a:rPr>
+              <a:t>to literature.</a:t>
+            </a:r>
+            <a:endParaRPr lang="en-US" sz="1800" kern="100" spc="-10" dirty="0">
+              <a:effectLst/>
+              <a:latin typeface="Arial Narrow" panose="020B0604020202020204" pitchFamily="34" charset="0"/>
+              <a:ea typeface="Aptos" panose="020B0004020202020204" pitchFamily="34" charset="0"/>
+              <a:cs typeface="Times New Roman" panose="02020603050405020304" pitchFamily="18" charset="0"/>
+            </a:endParaRPr>
+          </a:p>
+          <a:p>
+            <a:pPr algn="just"/>
+            <a:endParaRPr lang="en-US" sz="1800" kern="100" spc="-10" dirty="0">
+              <a:effectLst/>
+              <a:latin typeface="Arial Narrow" panose="020B0604020202020204" pitchFamily="34" charset="0"/>
+              <a:ea typeface="Aptos" panose="020B0004020202020204" pitchFamily="34" charset="0"/>
+              <a:cs typeface="Times New Roman" panose="02020603050405020304" pitchFamily="18" charset="0"/>
+            </a:endParaRPr>
+          </a:p>
+          <a:p>
+            <a:pPr algn="just"/>
+            <a:r>
+              <a:rPr lang="en-US" sz="1800" kern="100" spc="-10" dirty="0" err="1">
                 <a:effectLst/>
                 <a:latin typeface="Arial Narrow" panose="020B0604020202020204" pitchFamily="34" charset="0"/>
                 <a:ea typeface="Aptos" panose="020B0004020202020204" pitchFamily="34" charset="0"/>
@@ -34371,7 +34461,7 @@
           </a:ln>
           <a:extLst>
             <a:ext uri="{C572A759-6A51-4108-AA02-DFA0A04FC94B}">
-              <ma14:wrappingTextBoxFlag xmlns="" xmlns:m="http://schemas.openxmlformats.org/officeDocument/2006/math" xmlns:a14="http://schemas.microsoft.com/office/drawing/2010/main" xmlns:ma14="http://schemas.microsoft.com/office/mac/drawingml/2011/main" val="1"/>
+              <ma14:wrappingTextBoxFlag xmlns:ma14="http://schemas.microsoft.com/office/mac/drawingml/2011/main" xmlns:a14="http://schemas.microsoft.com/office/drawing/2010/main" xmlns:m="http://schemas.openxmlformats.org/officeDocument/2006/math" xmlns="" val="1"/>
             </a:ext>
           </a:extLst>
         </p:spPr>
@@ -34783,7 +34873,7 @@
           </a:ln>
           <a:extLst>
             <a:ext uri="{C572A759-6A51-4108-AA02-DFA0A04FC94B}">
-              <ma14:wrappingTextBoxFlag xmlns="" xmlns:m="http://schemas.openxmlformats.org/officeDocument/2006/math" xmlns:a14="http://schemas.microsoft.com/office/drawing/2010/main" xmlns:ma14="http://schemas.microsoft.com/office/mac/drawingml/2011/main" val="1"/>
+              <ma14:wrappingTextBoxFlag xmlns:ma14="http://schemas.microsoft.com/office/mac/drawingml/2011/main" xmlns:a14="http://schemas.microsoft.com/office/drawing/2010/main" xmlns:m="http://schemas.openxmlformats.org/officeDocument/2006/math" xmlns="" val="1"/>
             </a:ext>
           </a:extLst>
         </p:spPr>
@@ -35230,7 +35320,7 @@
           </a:ln>
           <a:extLst>
             <a:ext uri="{C572A759-6A51-4108-AA02-DFA0A04FC94B}">
-              <ma14:wrappingTextBoxFlag xmlns="" xmlns:m="http://schemas.openxmlformats.org/officeDocument/2006/math" xmlns:a14="http://schemas.microsoft.com/office/drawing/2010/main" xmlns:ma14="http://schemas.microsoft.com/office/mac/drawingml/2011/main" val="1"/>
+              <ma14:wrappingTextBoxFlag xmlns:ma14="http://schemas.microsoft.com/office/mac/drawingml/2011/main" xmlns:a14="http://schemas.microsoft.com/office/drawing/2010/main" xmlns:m="http://schemas.openxmlformats.org/officeDocument/2006/math" xmlns="" val="1"/>
             </a:ext>
           </a:extLst>
         </p:spPr>
@@ -35440,7 +35530,7 @@
           </a:ln>
           <a:extLst>
             <a:ext uri="{C572A759-6A51-4108-AA02-DFA0A04FC94B}">
-              <ma14:wrappingTextBoxFlag xmlns="" xmlns:m="http://schemas.openxmlformats.org/officeDocument/2006/math" xmlns:a14="http://schemas.microsoft.com/office/drawing/2010/main" xmlns:ma14="http://schemas.microsoft.com/office/mac/drawingml/2011/main" val="1"/>
+              <ma14:wrappingTextBoxFlag xmlns:ma14="http://schemas.microsoft.com/office/mac/drawingml/2011/main" xmlns:a14="http://schemas.microsoft.com/office/drawing/2010/main" xmlns:m="http://schemas.openxmlformats.org/officeDocument/2006/math" xmlns="" val="1"/>
             </a:ext>
           </a:extLst>
         </p:spPr>
@@ -47320,61 +47410,61 @@
 </file>
 
 <file path=customXml/item1.xml><?xml version="1.0" encoding="utf-8"?>
+<TemplafySlideFormConfiguration><![CDATA[{"formFields":[],"formDataEntries":[]}]]></TemplafySlideFormConfiguration>
+</file>
+
+<file path=customXml/item2.xml><?xml version="1.0" encoding="utf-8"?>
 <TemplafySlideTemplateConfiguration><![CDATA[{"slideVersion":1,"isValidatorEnabled":false,"isLocked":false,"elementsMetadata":[],"slideId":"638048769900279182","enableDocumentContentUpdater":false,"version":"2.0"}]]></TemplafySlideTemplateConfiguration>
 </file>
 
-<file path=customXml/item2.xml><?xml version="1.0" encoding="utf-8"?>
+<file path=customXml/item3.xml><?xml version="1.0" encoding="utf-8"?>
+<TemplafyFormConfiguration><![CDATA[{"formFields":[],"formDataEntries":[]}]]></TemplafyFormConfiguration>
+</file>
+
+<file path=customXml/item4.xml><?xml version="1.0" encoding="utf-8"?>
+<TemplafyTemplateConfiguration><![CDATA[{"elementsMetadata":[],"transformationConfigurations":[],"templateName":"Template 2024","templateDescription":"","enableDocumentContentUpdater":false,"version":"2.0"}]]></TemplafyTemplateConfiguration>
+</file>
+
+<file path=customXml/item5.xml><?xml version="1.0" encoding="utf-8"?>
 <TemplafySlideFormConfiguration><![CDATA[{"formFields":[],"formDataEntries":[]}]]></TemplafySlideFormConfiguration>
 </file>
 
-<file path=customXml/item3.xml><?xml version="1.0" encoding="utf-8"?>
-<TemplafyTemplateConfiguration><![CDATA[{"elementsMetadata":[],"transformationConfigurations":[],"templateName":"Template 2024","templateDescription":"","enableDocumentContentUpdater":false,"version":"2.0"}]]></TemplafyTemplateConfiguration>
-</file>
-
-<file path=customXml/item4.xml><?xml version="1.0" encoding="utf-8"?>
-<TemplafyFormConfiguration><![CDATA[{"formFields":[],"formDataEntries":[]}]]></TemplafyFormConfiguration>
-</file>
-
-<file path=customXml/item5.xml><?xml version="1.0" encoding="utf-8"?>
+<file path=customXml/item6.xml><?xml version="1.0" encoding="utf-8"?>
 <TemplafySlideTemplateConfiguration><![CDATA[{"slideVersion":1,"isValidatorEnabled":false,"isLocked":false,"elementsMetadata":[],"slideId":"638048769900279182","enableDocumentContentUpdater":false,"version":"2.0"}]]></TemplafySlideTemplateConfiguration>
 </file>
 
-<file path=customXml/item6.xml><?xml version="1.0" encoding="utf-8"?>
-<TemplafySlideFormConfiguration><![CDATA[{"formFields":[],"formDataEntries":[]}]]></TemplafySlideFormConfiguration>
-</file>
-
 <file path=customXml/itemProps1.xml><?xml version="1.0" encoding="utf-8"?>
-<ds:datastoreItem xmlns:ds="http://schemas.openxmlformats.org/officeDocument/2006/customXml" ds:itemID="{4427119E-0EC6-45F3-B5C4-5D645139FD8A}">
+<ds:datastoreItem xmlns:ds="http://schemas.openxmlformats.org/officeDocument/2006/customXml" ds:itemID="{318FE172-2E4A-41F3-98F3-1CD8CCD9375A}">
   <ds:schemaRefs/>
 </ds:datastoreItem>
 </file>
 
 <file path=customXml/itemProps2.xml><?xml version="1.0" encoding="utf-8"?>
+<ds:datastoreItem xmlns:ds="http://schemas.openxmlformats.org/officeDocument/2006/customXml" ds:itemID="{31A6E273-308C-4E61-93A6-3725B57DDBD2}">
+  <ds:schemaRefs/>
+</ds:datastoreItem>
+</file>
+
+<file path=customXml/itemProps3.xml><?xml version="1.0" encoding="utf-8"?>
+<ds:datastoreItem xmlns:ds="http://schemas.openxmlformats.org/officeDocument/2006/customXml" ds:itemID="{9A03A13C-D5E3-49F8-B37D-AFA024345652}">
+  <ds:schemaRefs/>
+</ds:datastoreItem>
+</file>
+
+<file path=customXml/itemProps4.xml><?xml version="1.0" encoding="utf-8"?>
+<ds:datastoreItem xmlns:ds="http://schemas.openxmlformats.org/officeDocument/2006/customXml" ds:itemID="{43877E11-121F-45E2-A0FE-16DFA988BBD5}">
+  <ds:schemaRefs/>
+</ds:datastoreItem>
+</file>
+
+<file path=customXml/itemProps5.xml><?xml version="1.0" encoding="utf-8"?>
 <ds:datastoreItem xmlns:ds="http://schemas.openxmlformats.org/officeDocument/2006/customXml" ds:itemID="{B779C644-68B7-4164-9D25-5094A90807DA}">
   <ds:schemaRefs/>
 </ds:datastoreItem>
 </file>
 
-<file path=customXml/itemProps3.xml><?xml version="1.0" encoding="utf-8"?>
-<ds:datastoreItem xmlns:ds="http://schemas.openxmlformats.org/officeDocument/2006/customXml" ds:itemID="{43877E11-121F-45E2-A0FE-16DFA988BBD5}">
-  <ds:schemaRefs/>
-</ds:datastoreItem>
-</file>
-
-<file path=customXml/itemProps4.xml><?xml version="1.0" encoding="utf-8"?>
-<ds:datastoreItem xmlns:ds="http://schemas.openxmlformats.org/officeDocument/2006/customXml" ds:itemID="{9A03A13C-D5E3-49F8-B37D-AFA024345652}">
-  <ds:schemaRefs/>
-</ds:datastoreItem>
-</file>
-
-<file path=customXml/itemProps5.xml><?xml version="1.0" encoding="utf-8"?>
-<ds:datastoreItem xmlns:ds="http://schemas.openxmlformats.org/officeDocument/2006/customXml" ds:itemID="{31A6E273-308C-4E61-93A6-3725B57DDBD2}">
-  <ds:schemaRefs/>
-</ds:datastoreItem>
-</file>
-
 <file path=customXml/itemProps6.xml><?xml version="1.0" encoding="utf-8"?>
-<ds:datastoreItem xmlns:ds="http://schemas.openxmlformats.org/officeDocument/2006/customXml" ds:itemID="{318FE172-2E4A-41F3-98F3-1CD8CCD9375A}">
+<ds:datastoreItem xmlns:ds="http://schemas.openxmlformats.org/officeDocument/2006/customXml" ds:itemID="{4427119E-0EC6-45F3-B5C4-5D645139FD8A}">
   <ds:schemaRefs/>
 </ds:datastoreItem>
 </file>
</xml_diff>

<commit_message>
Created submissions folder and loaded recording
</commit_message>
<xml_diff>
--- a/06.Presentation/A3vedioA42_to Present.pptx
+++ b/06.Presentation/A3vedioA42_to Present.pptx
@@ -163,7 +163,7 @@
 <file path=ppt/charts/chart1.xml><?xml version="1.0" encoding="utf-8"?>
 <c:chartSpace xmlns:c="http://schemas.openxmlformats.org/drawingml/2006/chart" xmlns:a="http://schemas.openxmlformats.org/drawingml/2006/main" xmlns:r="http://schemas.openxmlformats.org/officeDocument/2006/relationships" xmlns:c16r2="http://schemas.microsoft.com/office/drawing/2015/06/chart">
   <c:date1904 val="0"/>
-  <c:lang val="en-GB"/>
+  <c:lang val="en-US"/>
   <c:roundedCorners val="0"/>
   <mc:AlternateContent xmlns:mc="http://schemas.openxmlformats.org/markup-compatibility/2006">
     <mc:Choice xmlns:c14="http://schemas.microsoft.com/office/drawing/2007/8/2/chart" Requires="c14">
@@ -744,7 +744,7 @@
 <file path=ppt/charts/chart2.xml><?xml version="1.0" encoding="utf-8"?>
 <c:chartSpace xmlns:c="http://schemas.openxmlformats.org/drawingml/2006/chart" xmlns:a="http://schemas.openxmlformats.org/drawingml/2006/main" xmlns:r="http://schemas.openxmlformats.org/officeDocument/2006/relationships" xmlns:c16r2="http://schemas.microsoft.com/office/drawing/2015/06/chart">
   <c:date1904 val="0"/>
-  <c:lang val="en-GB"/>
+  <c:lang val="en-US"/>
   <c:roundedCorners val="0"/>
   <mc:AlternateContent xmlns:mc="http://schemas.openxmlformats.org/markup-compatibility/2006">
     <mc:Choice xmlns:c14="http://schemas.microsoft.com/office/drawing/2007/8/2/chart" Requires="c14">
@@ -6229,14 +6229,14 @@
     <dgm:cxn modelId="{36D4FA2A-F96E-4C48-9458-072ADB3599C4}" type="presOf" srcId="{1CB336AD-7B8A-4E77-98C9-B144AAE62BBB}" destId="{582B1624-CFB9-4155-A13D-733F41F870E1}" srcOrd="0" destOrd="0" presId="urn:microsoft.com/office/officeart/2005/8/layout/hierarchy5"/>
     <dgm:cxn modelId="{4D5DA832-8667-43BC-BFEB-E893963ADFED}" type="presOf" srcId="{FF70D626-FA02-4265-9FA3-60B43DFF9C51}" destId="{6179EC4F-D4F5-4858-B2CE-F63D95CF5311}" srcOrd="1" destOrd="0" presId="urn:microsoft.com/office/officeart/2005/8/layout/hierarchy5"/>
     <dgm:cxn modelId="{4AD33E3D-24A6-4495-90F6-E166EDEF8D25}" srcId="{8D073FB6-8CD1-49BC-B71C-1770D1789B42}" destId="{5B32A6E6-86EC-4925-ABC0-1837794A5CE7}" srcOrd="0" destOrd="0" parTransId="{E07F651A-D1B7-47C8-8D0F-ABF9B05A64E0}" sibTransId="{12B001EC-8117-479E-A1FB-8CDADF5224F0}"/>
+    <dgm:cxn modelId="{8540145D-0FF6-4FF4-8F06-C6D8E0407904}" type="presOf" srcId="{D6E637EA-0270-4102-BFD5-0A464D5B9FC2}" destId="{B4C65A40-9E2A-41DC-9BAC-254A833EBF26}" srcOrd="0" destOrd="0" presId="urn:microsoft.com/office/officeart/2005/8/layout/hierarchy5"/>
+    <dgm:cxn modelId="{D8D88B65-29A6-4F74-9063-D0365D3AE5B1}" srcId="{4DD9407C-460B-4D1E-95F3-7DC7B944C0AB}" destId="{1922A216-6FB8-482C-BA23-FE4C46BB2C2E}" srcOrd="0" destOrd="0" parTransId="{B447FC85-9F9F-4426-B14C-52C62C76149A}" sibTransId="{626CA79D-0EF2-4D22-A988-4BA00374986E}"/>
     <dgm:cxn modelId="{7D447E46-0C89-45EC-B9EE-DEC566B5FEED}" type="presOf" srcId="{77059FDB-0595-4162-9C07-B65F853B5E46}" destId="{B1D1D582-6234-43C5-A87E-DBC57AED7D8B}" srcOrd="0" destOrd="0" presId="urn:microsoft.com/office/officeart/2005/8/layout/hierarchy5"/>
     <dgm:cxn modelId="{254D4447-581F-4F4D-B2AD-18ABE545207D}" type="presOf" srcId="{E6323456-5927-457A-876E-4416577BB771}" destId="{489275FA-36DF-49A6-9C08-B8E8744A6D56}" srcOrd="0" destOrd="0" presId="urn:microsoft.com/office/officeart/2005/8/layout/hierarchy5"/>
     <dgm:cxn modelId="{70FDD64F-70E8-4505-AB86-15BF75673666}" srcId="{77059FDB-0595-4162-9C07-B65F853B5E46}" destId="{8D073FB6-8CD1-49BC-B71C-1770D1789B42}" srcOrd="0" destOrd="0" parTransId="{F1E6DA9D-3E15-4268-8109-0694AC77DA5E}" sibTransId="{87BFA7EC-E0C3-4BD1-8163-0AD976CD5A40}"/>
     <dgm:cxn modelId="{434B1453-17C0-4E4C-8528-4B335EC8CCCB}" type="presOf" srcId="{E6323456-5927-457A-876E-4416577BB771}" destId="{E4F3A596-3326-45AA-B600-CD423CBB6B52}" srcOrd="1" destOrd="0" presId="urn:microsoft.com/office/officeart/2005/8/layout/hierarchy5"/>
+    <dgm:cxn modelId="{E2C63C74-0A24-44F8-B2FF-B1E3FB7F7E19}" type="presOf" srcId="{4DD9407C-460B-4D1E-95F3-7DC7B944C0AB}" destId="{1011E41C-C8FA-4D0B-A0BF-5E8F7EFE30F6}" srcOrd="0" destOrd="0" presId="urn:microsoft.com/office/officeart/2005/8/layout/hierarchy5"/>
     <dgm:cxn modelId="{47507659-59C9-429A-9863-9DB8B9AEE23B}" type="presOf" srcId="{E03D74C0-F370-4DDD-8E85-5A4107D020A4}" destId="{C061E002-D3F6-4313-BA49-8614DA4609FF}" srcOrd="0" destOrd="0" presId="urn:microsoft.com/office/officeart/2005/8/layout/hierarchy5"/>
-    <dgm:cxn modelId="{8540145D-0FF6-4FF4-8F06-C6D8E0407904}" type="presOf" srcId="{D6E637EA-0270-4102-BFD5-0A464D5B9FC2}" destId="{B4C65A40-9E2A-41DC-9BAC-254A833EBF26}" srcOrd="0" destOrd="0" presId="urn:microsoft.com/office/officeart/2005/8/layout/hierarchy5"/>
-    <dgm:cxn modelId="{D8D88B65-29A6-4F74-9063-D0365D3AE5B1}" srcId="{4DD9407C-460B-4D1E-95F3-7DC7B944C0AB}" destId="{1922A216-6FB8-482C-BA23-FE4C46BB2C2E}" srcOrd="0" destOrd="0" parTransId="{B447FC85-9F9F-4426-B14C-52C62C76149A}" sibTransId="{626CA79D-0EF2-4D22-A988-4BA00374986E}"/>
-    <dgm:cxn modelId="{E2C63C74-0A24-44F8-B2FF-B1E3FB7F7E19}" type="presOf" srcId="{4DD9407C-460B-4D1E-95F3-7DC7B944C0AB}" destId="{1011E41C-C8FA-4D0B-A0BF-5E8F7EFE30F6}" srcOrd="0" destOrd="0" presId="urn:microsoft.com/office/officeart/2005/8/layout/hierarchy5"/>
     <dgm:cxn modelId="{5F51A079-2CED-485C-BDF9-6994094DE878}" type="presOf" srcId="{B447FC85-9F9F-4426-B14C-52C62C76149A}" destId="{2FD44EF0-25CF-4AA0-BADD-C499D08B8496}" srcOrd="1" destOrd="0" presId="urn:microsoft.com/office/officeart/2005/8/layout/hierarchy5"/>
     <dgm:cxn modelId="{574AEA7A-23A9-4D4D-9190-7D577828E55A}" srcId="{A348CCD9-BAD3-4676-8FC1-A9B8275D5933}" destId="{7501C7E2-7FB0-420E-A6BB-E12CEC6193BA}" srcOrd="1" destOrd="0" parTransId="{1CB336AD-7B8A-4E77-98C9-B144AAE62BBB}" sibTransId="{A7EBD326-708D-4ED4-A061-629DCC156D8B}"/>
     <dgm:cxn modelId="{2517DD81-1E21-4B83-87E9-33295281AE5B}" srcId="{5B32A6E6-86EC-4925-ABC0-1837794A5CE7}" destId="{C2322179-ED35-4DDF-984B-137F11AABF00}" srcOrd="0" destOrd="0" parTransId="{E6323456-5927-457A-876E-4416577BB771}" sibTransId="{CC0D64B2-C676-42E3-8FB6-EB803C0F46CD}"/>
@@ -7132,14 +7132,14 @@
     <dgm:cxn modelId="{36D4FA2A-F96E-4C48-9458-072ADB3599C4}" type="presOf" srcId="{1CB336AD-7B8A-4E77-98C9-B144AAE62BBB}" destId="{582B1624-CFB9-4155-A13D-733F41F870E1}" srcOrd="0" destOrd="0" presId="urn:microsoft.com/office/officeart/2005/8/layout/hierarchy5"/>
     <dgm:cxn modelId="{4D5DA832-8667-43BC-BFEB-E893963ADFED}" type="presOf" srcId="{FF70D626-FA02-4265-9FA3-60B43DFF9C51}" destId="{6179EC4F-D4F5-4858-B2CE-F63D95CF5311}" srcOrd="1" destOrd="0" presId="urn:microsoft.com/office/officeart/2005/8/layout/hierarchy5"/>
     <dgm:cxn modelId="{4AD33E3D-24A6-4495-90F6-E166EDEF8D25}" srcId="{8D073FB6-8CD1-49BC-B71C-1770D1789B42}" destId="{5B32A6E6-86EC-4925-ABC0-1837794A5CE7}" srcOrd="0" destOrd="0" parTransId="{E07F651A-D1B7-47C8-8D0F-ABF9B05A64E0}" sibTransId="{12B001EC-8117-479E-A1FB-8CDADF5224F0}"/>
+    <dgm:cxn modelId="{8540145D-0FF6-4FF4-8F06-C6D8E0407904}" type="presOf" srcId="{D6E637EA-0270-4102-BFD5-0A464D5B9FC2}" destId="{B4C65A40-9E2A-41DC-9BAC-254A833EBF26}" srcOrd="0" destOrd="0" presId="urn:microsoft.com/office/officeart/2005/8/layout/hierarchy5"/>
+    <dgm:cxn modelId="{D8D88B65-29A6-4F74-9063-D0365D3AE5B1}" srcId="{4DD9407C-460B-4D1E-95F3-7DC7B944C0AB}" destId="{1922A216-6FB8-482C-BA23-FE4C46BB2C2E}" srcOrd="0" destOrd="0" parTransId="{B447FC85-9F9F-4426-B14C-52C62C76149A}" sibTransId="{626CA79D-0EF2-4D22-A988-4BA00374986E}"/>
     <dgm:cxn modelId="{7D447E46-0C89-45EC-B9EE-DEC566B5FEED}" type="presOf" srcId="{77059FDB-0595-4162-9C07-B65F853B5E46}" destId="{B1D1D582-6234-43C5-A87E-DBC57AED7D8B}" srcOrd="0" destOrd="0" presId="urn:microsoft.com/office/officeart/2005/8/layout/hierarchy5"/>
     <dgm:cxn modelId="{254D4447-581F-4F4D-B2AD-18ABE545207D}" type="presOf" srcId="{E6323456-5927-457A-876E-4416577BB771}" destId="{489275FA-36DF-49A6-9C08-B8E8744A6D56}" srcOrd="0" destOrd="0" presId="urn:microsoft.com/office/officeart/2005/8/layout/hierarchy5"/>
     <dgm:cxn modelId="{70FDD64F-70E8-4505-AB86-15BF75673666}" srcId="{77059FDB-0595-4162-9C07-B65F853B5E46}" destId="{8D073FB6-8CD1-49BC-B71C-1770D1789B42}" srcOrd="0" destOrd="0" parTransId="{F1E6DA9D-3E15-4268-8109-0694AC77DA5E}" sibTransId="{87BFA7EC-E0C3-4BD1-8163-0AD976CD5A40}"/>
     <dgm:cxn modelId="{434B1453-17C0-4E4C-8528-4B335EC8CCCB}" type="presOf" srcId="{E6323456-5927-457A-876E-4416577BB771}" destId="{E4F3A596-3326-45AA-B600-CD423CBB6B52}" srcOrd="1" destOrd="0" presId="urn:microsoft.com/office/officeart/2005/8/layout/hierarchy5"/>
+    <dgm:cxn modelId="{E2C63C74-0A24-44F8-B2FF-B1E3FB7F7E19}" type="presOf" srcId="{4DD9407C-460B-4D1E-95F3-7DC7B944C0AB}" destId="{1011E41C-C8FA-4D0B-A0BF-5E8F7EFE30F6}" srcOrd="0" destOrd="0" presId="urn:microsoft.com/office/officeart/2005/8/layout/hierarchy5"/>
     <dgm:cxn modelId="{47507659-59C9-429A-9863-9DB8B9AEE23B}" type="presOf" srcId="{E03D74C0-F370-4DDD-8E85-5A4107D020A4}" destId="{C061E002-D3F6-4313-BA49-8614DA4609FF}" srcOrd="0" destOrd="0" presId="urn:microsoft.com/office/officeart/2005/8/layout/hierarchy5"/>
-    <dgm:cxn modelId="{8540145D-0FF6-4FF4-8F06-C6D8E0407904}" type="presOf" srcId="{D6E637EA-0270-4102-BFD5-0A464D5B9FC2}" destId="{B4C65A40-9E2A-41DC-9BAC-254A833EBF26}" srcOrd="0" destOrd="0" presId="urn:microsoft.com/office/officeart/2005/8/layout/hierarchy5"/>
-    <dgm:cxn modelId="{D8D88B65-29A6-4F74-9063-D0365D3AE5B1}" srcId="{4DD9407C-460B-4D1E-95F3-7DC7B944C0AB}" destId="{1922A216-6FB8-482C-BA23-FE4C46BB2C2E}" srcOrd="0" destOrd="0" parTransId="{B447FC85-9F9F-4426-B14C-52C62C76149A}" sibTransId="{626CA79D-0EF2-4D22-A988-4BA00374986E}"/>
-    <dgm:cxn modelId="{E2C63C74-0A24-44F8-B2FF-B1E3FB7F7E19}" type="presOf" srcId="{4DD9407C-460B-4D1E-95F3-7DC7B944C0AB}" destId="{1011E41C-C8FA-4D0B-A0BF-5E8F7EFE30F6}" srcOrd="0" destOrd="0" presId="urn:microsoft.com/office/officeart/2005/8/layout/hierarchy5"/>
     <dgm:cxn modelId="{5F51A079-2CED-485C-BDF9-6994094DE878}" type="presOf" srcId="{B447FC85-9F9F-4426-B14C-52C62C76149A}" destId="{2FD44EF0-25CF-4AA0-BADD-C499D08B8496}" srcOrd="1" destOrd="0" presId="urn:microsoft.com/office/officeart/2005/8/layout/hierarchy5"/>
     <dgm:cxn modelId="{574AEA7A-23A9-4D4D-9190-7D577828E55A}" srcId="{A348CCD9-BAD3-4676-8FC1-A9B8275D5933}" destId="{7501C7E2-7FB0-420E-A6BB-E12CEC6193BA}" srcOrd="1" destOrd="0" parTransId="{1CB336AD-7B8A-4E77-98C9-B144AAE62BBB}" sibTransId="{A7EBD326-708D-4ED4-A061-629DCC156D8B}"/>
     <dgm:cxn modelId="{2517DD81-1E21-4B83-87E9-33295281AE5B}" srcId="{5B32A6E6-86EC-4925-ABC0-1837794A5CE7}" destId="{C2322179-ED35-4DDF-984B-137F11AABF00}" srcOrd="0" destOrd="0" parTransId="{E6323456-5927-457A-876E-4416577BB771}" sibTransId="{CC0D64B2-C676-42E3-8FB6-EB803C0F46CD}"/>
@@ -8045,14 +8045,14 @@
     <dgm:cxn modelId="{36D4FA2A-F96E-4C48-9458-072ADB3599C4}" type="presOf" srcId="{1CB336AD-7B8A-4E77-98C9-B144AAE62BBB}" destId="{582B1624-CFB9-4155-A13D-733F41F870E1}" srcOrd="0" destOrd="0" presId="urn:microsoft.com/office/officeart/2005/8/layout/hierarchy5"/>
     <dgm:cxn modelId="{4D5DA832-8667-43BC-BFEB-E893963ADFED}" type="presOf" srcId="{FF70D626-FA02-4265-9FA3-60B43DFF9C51}" destId="{6179EC4F-D4F5-4858-B2CE-F63D95CF5311}" srcOrd="1" destOrd="0" presId="urn:microsoft.com/office/officeart/2005/8/layout/hierarchy5"/>
     <dgm:cxn modelId="{4AD33E3D-24A6-4495-90F6-E166EDEF8D25}" srcId="{8D073FB6-8CD1-49BC-B71C-1770D1789B42}" destId="{5B32A6E6-86EC-4925-ABC0-1837794A5CE7}" srcOrd="0" destOrd="0" parTransId="{E07F651A-D1B7-47C8-8D0F-ABF9B05A64E0}" sibTransId="{12B001EC-8117-479E-A1FB-8CDADF5224F0}"/>
+    <dgm:cxn modelId="{8540145D-0FF6-4FF4-8F06-C6D8E0407904}" type="presOf" srcId="{D6E637EA-0270-4102-BFD5-0A464D5B9FC2}" destId="{B4C65A40-9E2A-41DC-9BAC-254A833EBF26}" srcOrd="0" destOrd="0" presId="urn:microsoft.com/office/officeart/2005/8/layout/hierarchy5"/>
+    <dgm:cxn modelId="{D8D88B65-29A6-4F74-9063-D0365D3AE5B1}" srcId="{4DD9407C-460B-4D1E-95F3-7DC7B944C0AB}" destId="{1922A216-6FB8-482C-BA23-FE4C46BB2C2E}" srcOrd="0" destOrd="0" parTransId="{B447FC85-9F9F-4426-B14C-52C62C76149A}" sibTransId="{626CA79D-0EF2-4D22-A988-4BA00374986E}"/>
     <dgm:cxn modelId="{7D447E46-0C89-45EC-B9EE-DEC566B5FEED}" type="presOf" srcId="{77059FDB-0595-4162-9C07-B65F853B5E46}" destId="{B1D1D582-6234-43C5-A87E-DBC57AED7D8B}" srcOrd="0" destOrd="0" presId="urn:microsoft.com/office/officeart/2005/8/layout/hierarchy5"/>
     <dgm:cxn modelId="{254D4447-581F-4F4D-B2AD-18ABE545207D}" type="presOf" srcId="{E6323456-5927-457A-876E-4416577BB771}" destId="{489275FA-36DF-49A6-9C08-B8E8744A6D56}" srcOrd="0" destOrd="0" presId="urn:microsoft.com/office/officeart/2005/8/layout/hierarchy5"/>
     <dgm:cxn modelId="{70FDD64F-70E8-4505-AB86-15BF75673666}" srcId="{77059FDB-0595-4162-9C07-B65F853B5E46}" destId="{8D073FB6-8CD1-49BC-B71C-1770D1789B42}" srcOrd="0" destOrd="0" parTransId="{F1E6DA9D-3E15-4268-8109-0694AC77DA5E}" sibTransId="{87BFA7EC-E0C3-4BD1-8163-0AD976CD5A40}"/>
     <dgm:cxn modelId="{434B1453-17C0-4E4C-8528-4B335EC8CCCB}" type="presOf" srcId="{E6323456-5927-457A-876E-4416577BB771}" destId="{E4F3A596-3326-45AA-B600-CD423CBB6B52}" srcOrd="1" destOrd="0" presId="urn:microsoft.com/office/officeart/2005/8/layout/hierarchy5"/>
+    <dgm:cxn modelId="{E2C63C74-0A24-44F8-B2FF-B1E3FB7F7E19}" type="presOf" srcId="{4DD9407C-460B-4D1E-95F3-7DC7B944C0AB}" destId="{1011E41C-C8FA-4D0B-A0BF-5E8F7EFE30F6}" srcOrd="0" destOrd="0" presId="urn:microsoft.com/office/officeart/2005/8/layout/hierarchy5"/>
     <dgm:cxn modelId="{47507659-59C9-429A-9863-9DB8B9AEE23B}" type="presOf" srcId="{E03D74C0-F370-4DDD-8E85-5A4107D020A4}" destId="{C061E002-D3F6-4313-BA49-8614DA4609FF}" srcOrd="0" destOrd="0" presId="urn:microsoft.com/office/officeart/2005/8/layout/hierarchy5"/>
-    <dgm:cxn modelId="{8540145D-0FF6-4FF4-8F06-C6D8E0407904}" type="presOf" srcId="{D6E637EA-0270-4102-BFD5-0A464D5B9FC2}" destId="{B4C65A40-9E2A-41DC-9BAC-254A833EBF26}" srcOrd="0" destOrd="0" presId="urn:microsoft.com/office/officeart/2005/8/layout/hierarchy5"/>
-    <dgm:cxn modelId="{D8D88B65-29A6-4F74-9063-D0365D3AE5B1}" srcId="{4DD9407C-460B-4D1E-95F3-7DC7B944C0AB}" destId="{1922A216-6FB8-482C-BA23-FE4C46BB2C2E}" srcOrd="0" destOrd="0" parTransId="{B447FC85-9F9F-4426-B14C-52C62C76149A}" sibTransId="{626CA79D-0EF2-4D22-A988-4BA00374986E}"/>
-    <dgm:cxn modelId="{E2C63C74-0A24-44F8-B2FF-B1E3FB7F7E19}" type="presOf" srcId="{4DD9407C-460B-4D1E-95F3-7DC7B944C0AB}" destId="{1011E41C-C8FA-4D0B-A0BF-5E8F7EFE30F6}" srcOrd="0" destOrd="0" presId="urn:microsoft.com/office/officeart/2005/8/layout/hierarchy5"/>
     <dgm:cxn modelId="{5F51A079-2CED-485C-BDF9-6994094DE878}" type="presOf" srcId="{B447FC85-9F9F-4426-B14C-52C62C76149A}" destId="{2FD44EF0-25CF-4AA0-BADD-C499D08B8496}" srcOrd="1" destOrd="0" presId="urn:microsoft.com/office/officeart/2005/8/layout/hierarchy5"/>
     <dgm:cxn modelId="{574AEA7A-23A9-4D4D-9190-7D577828E55A}" srcId="{A348CCD9-BAD3-4676-8FC1-A9B8275D5933}" destId="{7501C7E2-7FB0-420E-A6BB-E12CEC6193BA}" srcOrd="1" destOrd="0" parTransId="{1CB336AD-7B8A-4E77-98C9-B144AAE62BBB}" sibTransId="{A7EBD326-708D-4ED4-A061-629DCC156D8B}"/>
     <dgm:cxn modelId="{2517DD81-1E21-4B83-87E9-33295281AE5B}" srcId="{5B32A6E6-86EC-4925-ABC0-1837794A5CE7}" destId="{C2322179-ED35-4DDF-984B-137F11AABF00}" srcOrd="0" destOrd="0" parTransId="{E6323456-5927-457A-876E-4416577BB771}" sibTransId="{CC0D64B2-C676-42E3-8FB6-EB803C0F46CD}"/>
@@ -8948,14 +8948,14 @@
     <dgm:cxn modelId="{36D4FA2A-F96E-4C48-9458-072ADB3599C4}" type="presOf" srcId="{1CB336AD-7B8A-4E77-98C9-B144AAE62BBB}" destId="{582B1624-CFB9-4155-A13D-733F41F870E1}" srcOrd="0" destOrd="0" presId="urn:microsoft.com/office/officeart/2005/8/layout/hierarchy5"/>
     <dgm:cxn modelId="{4D5DA832-8667-43BC-BFEB-E893963ADFED}" type="presOf" srcId="{FF70D626-FA02-4265-9FA3-60B43DFF9C51}" destId="{6179EC4F-D4F5-4858-B2CE-F63D95CF5311}" srcOrd="1" destOrd="0" presId="urn:microsoft.com/office/officeart/2005/8/layout/hierarchy5"/>
     <dgm:cxn modelId="{4AD33E3D-24A6-4495-90F6-E166EDEF8D25}" srcId="{8D073FB6-8CD1-49BC-B71C-1770D1789B42}" destId="{5B32A6E6-86EC-4925-ABC0-1837794A5CE7}" srcOrd="0" destOrd="0" parTransId="{E07F651A-D1B7-47C8-8D0F-ABF9B05A64E0}" sibTransId="{12B001EC-8117-479E-A1FB-8CDADF5224F0}"/>
+    <dgm:cxn modelId="{8540145D-0FF6-4FF4-8F06-C6D8E0407904}" type="presOf" srcId="{D6E637EA-0270-4102-BFD5-0A464D5B9FC2}" destId="{B4C65A40-9E2A-41DC-9BAC-254A833EBF26}" srcOrd="0" destOrd="0" presId="urn:microsoft.com/office/officeart/2005/8/layout/hierarchy5"/>
+    <dgm:cxn modelId="{D8D88B65-29A6-4F74-9063-D0365D3AE5B1}" srcId="{4DD9407C-460B-4D1E-95F3-7DC7B944C0AB}" destId="{1922A216-6FB8-482C-BA23-FE4C46BB2C2E}" srcOrd="0" destOrd="0" parTransId="{B447FC85-9F9F-4426-B14C-52C62C76149A}" sibTransId="{626CA79D-0EF2-4D22-A988-4BA00374986E}"/>
     <dgm:cxn modelId="{7D447E46-0C89-45EC-B9EE-DEC566B5FEED}" type="presOf" srcId="{77059FDB-0595-4162-9C07-B65F853B5E46}" destId="{B1D1D582-6234-43C5-A87E-DBC57AED7D8B}" srcOrd="0" destOrd="0" presId="urn:microsoft.com/office/officeart/2005/8/layout/hierarchy5"/>
     <dgm:cxn modelId="{254D4447-581F-4F4D-B2AD-18ABE545207D}" type="presOf" srcId="{E6323456-5927-457A-876E-4416577BB771}" destId="{489275FA-36DF-49A6-9C08-B8E8744A6D56}" srcOrd="0" destOrd="0" presId="urn:microsoft.com/office/officeart/2005/8/layout/hierarchy5"/>
     <dgm:cxn modelId="{70FDD64F-70E8-4505-AB86-15BF75673666}" srcId="{77059FDB-0595-4162-9C07-B65F853B5E46}" destId="{8D073FB6-8CD1-49BC-B71C-1770D1789B42}" srcOrd="0" destOrd="0" parTransId="{F1E6DA9D-3E15-4268-8109-0694AC77DA5E}" sibTransId="{87BFA7EC-E0C3-4BD1-8163-0AD976CD5A40}"/>
     <dgm:cxn modelId="{434B1453-17C0-4E4C-8528-4B335EC8CCCB}" type="presOf" srcId="{E6323456-5927-457A-876E-4416577BB771}" destId="{E4F3A596-3326-45AA-B600-CD423CBB6B52}" srcOrd="1" destOrd="0" presId="urn:microsoft.com/office/officeart/2005/8/layout/hierarchy5"/>
+    <dgm:cxn modelId="{E2C63C74-0A24-44F8-B2FF-B1E3FB7F7E19}" type="presOf" srcId="{4DD9407C-460B-4D1E-95F3-7DC7B944C0AB}" destId="{1011E41C-C8FA-4D0B-A0BF-5E8F7EFE30F6}" srcOrd="0" destOrd="0" presId="urn:microsoft.com/office/officeart/2005/8/layout/hierarchy5"/>
     <dgm:cxn modelId="{47507659-59C9-429A-9863-9DB8B9AEE23B}" type="presOf" srcId="{E03D74C0-F370-4DDD-8E85-5A4107D020A4}" destId="{C061E002-D3F6-4313-BA49-8614DA4609FF}" srcOrd="0" destOrd="0" presId="urn:microsoft.com/office/officeart/2005/8/layout/hierarchy5"/>
-    <dgm:cxn modelId="{8540145D-0FF6-4FF4-8F06-C6D8E0407904}" type="presOf" srcId="{D6E637EA-0270-4102-BFD5-0A464D5B9FC2}" destId="{B4C65A40-9E2A-41DC-9BAC-254A833EBF26}" srcOrd="0" destOrd="0" presId="urn:microsoft.com/office/officeart/2005/8/layout/hierarchy5"/>
-    <dgm:cxn modelId="{D8D88B65-29A6-4F74-9063-D0365D3AE5B1}" srcId="{4DD9407C-460B-4D1E-95F3-7DC7B944C0AB}" destId="{1922A216-6FB8-482C-BA23-FE4C46BB2C2E}" srcOrd="0" destOrd="0" parTransId="{B447FC85-9F9F-4426-B14C-52C62C76149A}" sibTransId="{626CA79D-0EF2-4D22-A988-4BA00374986E}"/>
-    <dgm:cxn modelId="{E2C63C74-0A24-44F8-B2FF-B1E3FB7F7E19}" type="presOf" srcId="{4DD9407C-460B-4D1E-95F3-7DC7B944C0AB}" destId="{1011E41C-C8FA-4D0B-A0BF-5E8F7EFE30F6}" srcOrd="0" destOrd="0" presId="urn:microsoft.com/office/officeart/2005/8/layout/hierarchy5"/>
     <dgm:cxn modelId="{5F51A079-2CED-485C-BDF9-6994094DE878}" type="presOf" srcId="{B447FC85-9F9F-4426-B14C-52C62C76149A}" destId="{2FD44EF0-25CF-4AA0-BADD-C499D08B8496}" srcOrd="1" destOrd="0" presId="urn:microsoft.com/office/officeart/2005/8/layout/hierarchy5"/>
     <dgm:cxn modelId="{574AEA7A-23A9-4D4D-9190-7D577828E55A}" srcId="{A348CCD9-BAD3-4676-8FC1-A9B8275D5933}" destId="{7501C7E2-7FB0-420E-A6BB-E12CEC6193BA}" srcOrd="1" destOrd="0" parTransId="{1CB336AD-7B8A-4E77-98C9-B144AAE62BBB}" sibTransId="{A7EBD326-708D-4ED4-A061-629DCC156D8B}"/>
     <dgm:cxn modelId="{2517DD81-1E21-4B83-87E9-33295281AE5B}" srcId="{5B32A6E6-86EC-4925-ABC0-1837794A5CE7}" destId="{C2322179-ED35-4DDF-984B-137F11AABF00}" srcOrd="0" destOrd="0" parTransId="{E6323456-5927-457A-876E-4416577BB771}" sibTransId="{CC0D64B2-C676-42E3-8FB6-EB803C0F46CD}"/>
@@ -24376,6 +24376,36 @@
           <a:bodyPr/>
           <a:lstStyle/>
           <a:p>
+            <a:r>
+              <a:rPr lang="en-US" sz="1800" dirty="0"/>
+              <a:t>Hi, I am Sarel Vermaak.</a:t>
+            </a:r>
+          </a:p>
+          <a:p>
+            <a:endParaRPr lang="en-US" sz="1800" dirty="0"/>
+          </a:p>
+          <a:p>
+            <a:r>
+              <a:rPr lang="en-US" sz="1800" dirty="0"/>
+              <a:t>Now that we have a base dataset and datasets with induced and imputed missing values, we can validate the performance of the imputation techniques by running classification models on each dataset and comparing the performance of each dataset.</a:t>
+            </a:r>
+          </a:p>
+          <a:p>
+            <a:r>
+              <a:rPr lang="en-US" sz="1800" dirty="0"/>
+              <a:t>I will present a decision tree classifier that was used as the first validation model.</a:t>
+            </a:r>
+          </a:p>
+          <a:p>
+            <a:endParaRPr lang="en-US" sz="1800" dirty="0"/>
+          </a:p>
+          <a:p>
+            <a:r>
+              <a:rPr lang="en-US" sz="1800" dirty="0"/>
+              <a:t>We used the base model before missing values were induced as a control. The base dataset was split into a test and train dataset, and these were used to determine the maximum tree depth hyperparameter for the decision tree. This was done by running the model for various tree depth values, measuring the weighted F1 score across prediction classes for the training and testing set. This metric is used as a measure of error in the model, and the optimal point is there the testing F1 score either stabilizes or decreases.</a:t>
+            </a:r>
+          </a:p>
+          <a:p>
             <a:pPr>
               <a:lnSpc>
                 <a:spcPct val="107000"/>
@@ -24473,6 +24503,27 @@
         <p:txBody>
           <a:bodyPr/>
           <a:lstStyle/>
+          <a:p>
+            <a:r>
+              <a:rPr lang="en-US" sz="1800" dirty="0"/>
+              <a:t>The model with optimal hyperparameters was then trained across the various datasets, and the accuracy and weighted F1 scores were computed for each based on predictions made against the base test table.</a:t>
+            </a:r>
+          </a:p>
+          <a:p>
+            <a:r>
+              <a:rPr lang="en-US" sz="1800" dirty="0"/>
+              <a:t>In this process we calculated control metrics using the base training and testing set. This base value is then compared against the mode and Naïve Bayes imputation techniques at three different levels of missing values induced on the base dataset, 10%, 40%, and 70%.</a:t>
+            </a:r>
+          </a:p>
+          <a:p>
+            <a:endParaRPr lang="en-US" sz="1800" dirty="0"/>
+          </a:p>
+          <a:p>
+            <a:r>
+              <a:rPr lang="en-US" sz="1800" dirty="0"/>
+              <a:t>From this we can see that the classification performance declines as the number of missing values increases as expected, and surprisingly enough the Naïve Bayes and Mode imputation techniques created datasets that performed very similarly at all levels.</a:t>
+            </a:r>
+          </a:p>
           <a:p>
             <a:pPr>
               <a:lnSpc>
@@ -25075,9 +25126,6 @@
   <p:clrMapOvr>
     <a:overrideClrMapping bg1="dk1" tx1="lt1" bg2="dk2" tx2="lt2" accent1="accent1" accent2="accent2" accent3="accent3" accent4="accent4" accent5="accent5" accent6="accent6" hlink="hlink" folHlink="folHlink"/>
   </p:clrMapOvr>
-  <p:transition spd="slow">
-    <p:push/>
-  </p:transition>
 </p:sldLayout>
 </file>
 
@@ -25355,9 +25403,6 @@
   <p:clrMapOvr>
     <a:masterClrMapping/>
   </p:clrMapOvr>
-  <p:transition spd="slow">
-    <p:push/>
-  </p:transition>
 </p:sldLayout>
 </file>
 
@@ -25635,9 +25680,6 @@
   <p:clrMapOvr>
     <a:masterClrMapping/>
   </p:clrMapOvr>
-  <p:transition spd="slow">
-    <p:push/>
-  </p:transition>
 </p:sldLayout>
 </file>
 
@@ -25912,9 +25954,6 @@
   <p:clrMapOvr>
     <a:masterClrMapping/>
   </p:clrMapOvr>
-  <p:transition spd="slow">
-    <p:push/>
-  </p:transition>
 </p:sldLayout>
 </file>
 
@@ -26189,9 +26228,6 @@
   <p:clrMapOvr>
     <a:masterClrMapping/>
   </p:clrMapOvr>
-  <p:transition spd="slow">
-    <p:push/>
-  </p:transition>
 </p:sldLayout>
 </file>
 
@@ -26668,9 +26704,6 @@
   <p:clrMapOvr>
     <a:overrideClrMapping bg1="dk1" tx1="lt1" bg2="dk2" tx2="lt2" accent1="accent1" accent2="accent2" accent3="accent3" accent4="accent4" accent5="accent5" accent6="accent6" hlink="hlink" folHlink="folHlink"/>
   </p:clrMapOvr>
-  <p:transition spd="slow">
-    <p:push/>
-  </p:transition>
 </p:sldLayout>
 </file>
 
@@ -26961,9 +26994,6 @@
   <p:clrMapOvr>
     <a:masterClrMapping/>
   </p:clrMapOvr>
-  <p:transition spd="slow">
-    <p:push/>
-  </p:transition>
 </p:sldLayout>
 </file>
 
@@ -27257,9 +27287,6 @@
   <p:clrMapOvr>
     <a:masterClrMapping/>
   </p:clrMapOvr>
-  <p:transition spd="slow">
-    <p:push/>
-  </p:transition>
 </p:sldLayout>
 </file>
 
@@ -27565,9 +27592,6 @@
   <p:clrMapOvr>
     <a:overrideClrMapping bg1="dk1" tx1="lt1" bg2="dk2" tx2="lt2" accent1="accent1" accent2="accent2" accent3="accent3" accent4="accent4" accent5="accent5" accent6="accent6" hlink="hlink" folHlink="folHlink"/>
   </p:clrMapOvr>
-  <p:transition spd="slow">
-    <p:push/>
-  </p:transition>
 </p:sldLayout>
 </file>
 
@@ -27821,9 +27845,6 @@
   <p:clrMapOvr>
     <a:overrideClrMapping bg1="lt1" tx1="dk1" bg2="lt2" tx2="dk2" accent1="accent1" accent2="accent2" accent3="accent3" accent4="accent4" accent5="accent5" accent6="accent6" hlink="hlink" folHlink="folHlink"/>
   </p:clrMapOvr>
-  <p:transition spd="slow">
-    <p:push/>
-  </p:transition>
 </p:sldLayout>
 </file>
 
@@ -28132,9 +28153,6 @@
   <p:clrMapOvr>
     <a:overrideClrMapping bg1="dk1" tx1="lt1" bg2="dk2" tx2="lt2" accent1="accent1" accent2="accent2" accent3="accent3" accent4="accent4" accent5="accent5" accent6="accent6" hlink="hlink" folHlink="folHlink"/>
   </p:clrMapOvr>
-  <p:transition spd="slow">
-    <p:push/>
-  </p:transition>
 </p:sldLayout>
 </file>
 
@@ -28380,9 +28398,6 @@
   <p:clrMapOvr>
     <a:overrideClrMapping bg1="lt1" tx1="dk1" bg2="lt2" tx2="dk2" accent1="accent1" accent2="accent2" accent3="accent3" accent4="accent4" accent5="accent5" accent6="accent6" hlink="hlink" folHlink="folHlink"/>
   </p:clrMapOvr>
-  <p:transition spd="slow">
-    <p:push/>
-  </p:transition>
 </p:sldLayout>
 </file>
 
@@ -28688,9 +28703,6 @@
   <p:clrMapOvr>
     <a:overrideClrMapping bg1="dk1" tx1="lt1" bg2="dk2" tx2="lt2" accent1="accent1" accent2="accent2" accent3="accent3" accent4="accent4" accent5="accent5" accent6="accent6" hlink="hlink" folHlink="folHlink"/>
   </p:clrMapOvr>
-  <p:transition spd="slow">
-    <p:push/>
-  </p:transition>
 </p:sldLayout>
 </file>
 
@@ -28944,9 +28956,6 @@
   <p:clrMapOvr>
     <a:overrideClrMapping bg1="lt1" tx1="dk1" bg2="lt2" tx2="dk2" accent1="accent1" accent2="accent2" accent3="accent3" accent4="accent4" accent5="accent5" accent6="accent6" hlink="hlink" folHlink="folHlink"/>
   </p:clrMapOvr>
-  <p:transition spd="slow">
-    <p:push/>
-  </p:transition>
 </p:sldLayout>
 </file>
 
@@ -29276,9 +29285,6 @@
   <p:clrMapOvr>
     <a:overrideClrMapping bg1="lt1" tx1="dk1" bg2="lt2" tx2="dk2" accent1="accent1" accent2="accent2" accent3="accent3" accent4="accent4" accent5="accent5" accent6="accent6" hlink="hlink" folHlink="folHlink"/>
   </p:clrMapOvr>
-  <p:transition spd="slow">
-    <p:push/>
-  </p:transition>
 </p:sldLayout>
 </file>
 
@@ -29660,9 +29666,6 @@
   <p:clrMapOvr>
     <a:overrideClrMapping bg1="lt1" tx1="dk1" bg2="lt2" tx2="dk2" accent1="accent1" accent2="accent2" accent3="accent3" accent4="accent4" accent5="accent5" accent6="accent6" hlink="hlink" folHlink="folHlink"/>
   </p:clrMapOvr>
-  <p:transition spd="slow">
-    <p:push/>
-  </p:transition>
 </p:sldLayout>
 </file>
 
@@ -29992,9 +29995,6 @@
   <p:clrMapOvr>
     <a:overrideClrMapping bg1="lt1" tx1="dk1" bg2="lt2" tx2="dk2" accent1="accent1" accent2="accent2" accent3="accent3" accent4="accent4" accent5="accent5" accent6="accent6" hlink="hlink" folHlink="folHlink"/>
   </p:clrMapOvr>
-  <p:transition spd="slow">
-    <p:push/>
-  </p:transition>
 </p:sldLayout>
 </file>
 
@@ -30317,9 +30317,6 @@
   <p:clrMapOvr>
     <a:overrideClrMapping bg1="lt1" tx1="dk1" bg2="lt2" tx2="dk2" accent1="accent1" accent2="accent2" accent3="accent3" accent4="accent4" accent5="accent5" accent6="accent6" hlink="hlink" folHlink="folHlink"/>
   </p:clrMapOvr>
-  <p:transition spd="slow">
-    <p:push/>
-  </p:transition>
 </p:sldLayout>
 </file>
 
@@ -30612,9 +30609,6 @@
   <p:clrMapOvr>
     <a:overrideClrMapping bg1="lt1" tx1="dk1" bg2="lt2" tx2="dk2" accent1="accent1" accent2="accent2" accent3="accent3" accent4="accent4" accent5="accent5" accent6="accent6" hlink="hlink" folHlink="folHlink"/>
   </p:clrMapOvr>
-  <p:transition spd="slow">
-    <p:push/>
-  </p:transition>
 </p:sldLayout>
 </file>
 
@@ -30962,9 +30956,6 @@
   <p:clrMapOvr>
     <a:overrideClrMapping bg1="dk1" tx1="lt1" bg2="dk2" tx2="lt2" accent1="accent1" accent2="accent2" accent3="accent3" accent4="accent4" accent5="accent5" accent6="accent6" hlink="hlink" folHlink="folHlink"/>
   </p:clrMapOvr>
-  <p:transition spd="slow">
-    <p:push/>
-  </p:transition>
 </p:sldLayout>
 </file>
 
@@ -31312,9 +31303,6 @@
   <p:clrMapOvr>
     <a:overrideClrMapping bg1="dk1" tx1="lt1" bg2="dk2" tx2="lt2" accent1="accent1" accent2="accent2" accent3="accent3" accent4="accent4" accent5="accent5" accent6="accent6" hlink="hlink" folHlink="folHlink"/>
   </p:clrMapOvr>
-  <p:transition spd="slow">
-    <p:push/>
-  </p:transition>
 </p:sldLayout>
 </file>
 
@@ -31673,9 +31661,6 @@
   <p:clrMapOvr>
     <a:overrideClrMapping bg1="lt1" tx1="dk1" bg2="lt2" tx2="dk2" accent1="accent1" accent2="accent2" accent3="accent3" accent4="accent4" accent5="accent5" accent6="accent6" hlink="hlink" folHlink="folHlink"/>
   </p:clrMapOvr>
-  <p:transition spd="slow">
-    <p:push/>
-  </p:transition>
 </p:sldLayout>
 </file>
 
@@ -32095,9 +32080,6 @@
   <p:clrMapOvr>
     <a:overrideClrMapping bg1="dk1" tx1="lt1" bg2="dk2" tx2="lt2" accent1="accent1" accent2="accent2" accent3="accent3" accent4="accent4" accent5="accent5" accent6="accent6" hlink="hlink" folHlink="folHlink"/>
   </p:clrMapOvr>
-  <p:transition spd="slow">
-    <p:push/>
-  </p:transition>
 </p:sldLayout>
 </file>
 
@@ -32420,9 +32402,6 @@
   <p:clrMapOvr>
     <a:overrideClrMapping bg1="lt1" tx1="dk1" bg2="lt2" tx2="dk2" accent1="accent1" accent2="accent2" accent3="accent3" accent4="accent4" accent5="accent5" accent6="accent6" hlink="hlink" folHlink="folHlink"/>
   </p:clrMapOvr>
-  <p:transition spd="slow">
-    <p:push/>
-  </p:transition>
 </p:sldLayout>
 </file>
 
@@ -32715,9 +32694,6 @@
   <p:clrMapOvr>
     <a:overrideClrMapping bg1="lt1" tx1="dk1" bg2="lt2" tx2="dk2" accent1="accent1" accent2="accent2" accent3="accent3" accent4="accent4" accent5="accent5" accent6="accent6" hlink="hlink" folHlink="folHlink"/>
   </p:clrMapOvr>
-  <p:transition spd="slow">
-    <p:push/>
-  </p:transition>
 </p:sldLayout>
 </file>
 
@@ -32894,9 +32870,6 @@
   <p:clrMapOvr>
     <a:masterClrMapping/>
   </p:clrMapOvr>
-  <p:transition spd="slow">
-    <p:push/>
-  </p:transition>
 </p:sldLayout>
 </file>
 
@@ -33112,9 +33085,6 @@
   <p:clrMapOvr>
     <a:masterClrMapping/>
   </p:clrMapOvr>
-  <p:transition spd="slow">
-    <p:push/>
-  </p:transition>
 </p:sldLayout>
 </file>
 
@@ -33375,9 +33345,6 @@
   <p:clrMapOvr>
     <a:masterClrMapping/>
   </p:clrMapOvr>
-  <p:transition spd="slow">
-    <p:push/>
-  </p:transition>
 </p:sldLayout>
 </file>
 
@@ -33676,9 +33643,6 @@
   <p:clrMapOvr>
     <a:masterClrMapping/>
   </p:clrMapOvr>
-  <p:transition spd="slow">
-    <p:push/>
-  </p:transition>
 </p:sldLayout>
 </file>
 
@@ -34015,9 +33979,6 @@
   <p:clrMapOvr>
     <a:masterClrMapping/>
   </p:clrMapOvr>
-  <p:transition spd="slow">
-    <p:push/>
-  </p:transition>
 </p:sldLayout>
 </file>
 
@@ -34163,9 +34124,6 @@
   <p:clrMapOvr>
     <a:masterClrMapping/>
   </p:clrMapOvr>
-  <p:transition spd="slow">
-    <p:push/>
-  </p:transition>
 </p:sldLayout>
 </file>
 
@@ -34413,9 +34371,6 @@
   <p:clrMapOvr>
     <a:masterClrMapping/>
   </p:clrMapOvr>
-  <p:transition spd="slow">
-    <p:push/>
-  </p:transition>
 </p:sldLayout>
 </file>
 
@@ -34461,7 +34416,7 @@
           </a:ln>
           <a:extLst>
             <a:ext uri="{C572A759-6A51-4108-AA02-DFA0A04FC94B}">
-              <ma14:wrappingTextBoxFlag xmlns:ma14="http://schemas.microsoft.com/office/mac/drawingml/2011/main" xmlns:a14="http://schemas.microsoft.com/office/drawing/2010/main" xmlns:m="http://schemas.openxmlformats.org/officeDocument/2006/math" xmlns="" val="1"/>
+              <ma14:wrappingTextBoxFlag xmlns="" xmlns:m="http://schemas.openxmlformats.org/officeDocument/2006/math" xmlns:a14="http://schemas.microsoft.com/office/drawing/2010/main" xmlns:ma14="http://schemas.microsoft.com/office/mac/drawingml/2011/main" val="1"/>
             </a:ext>
           </a:extLst>
         </p:spPr>
@@ -34873,7 +34828,7 @@
           </a:ln>
           <a:extLst>
             <a:ext uri="{C572A759-6A51-4108-AA02-DFA0A04FC94B}">
-              <ma14:wrappingTextBoxFlag xmlns:ma14="http://schemas.microsoft.com/office/mac/drawingml/2011/main" xmlns:a14="http://schemas.microsoft.com/office/drawing/2010/main" xmlns:m="http://schemas.openxmlformats.org/officeDocument/2006/math" xmlns="" val="1"/>
+              <ma14:wrappingTextBoxFlag xmlns="" xmlns:m="http://schemas.openxmlformats.org/officeDocument/2006/math" xmlns:a14="http://schemas.microsoft.com/office/drawing/2010/main" xmlns:ma14="http://schemas.microsoft.com/office/mac/drawingml/2011/main" val="1"/>
             </a:ext>
           </a:extLst>
         </p:spPr>
@@ -35320,7 +35275,7 @@
           </a:ln>
           <a:extLst>
             <a:ext uri="{C572A759-6A51-4108-AA02-DFA0A04FC94B}">
-              <ma14:wrappingTextBoxFlag xmlns:ma14="http://schemas.microsoft.com/office/mac/drawingml/2011/main" xmlns:a14="http://schemas.microsoft.com/office/drawing/2010/main" xmlns:m="http://schemas.openxmlformats.org/officeDocument/2006/math" xmlns="" val="1"/>
+              <ma14:wrappingTextBoxFlag xmlns="" xmlns:m="http://schemas.openxmlformats.org/officeDocument/2006/math" xmlns:a14="http://schemas.microsoft.com/office/drawing/2010/main" xmlns:ma14="http://schemas.microsoft.com/office/mac/drawingml/2011/main" val="1"/>
             </a:ext>
           </a:extLst>
         </p:spPr>
@@ -35530,7 +35485,7 @@
           </a:ln>
           <a:extLst>
             <a:ext uri="{C572A759-6A51-4108-AA02-DFA0A04FC94B}">
-              <ma14:wrappingTextBoxFlag xmlns:ma14="http://schemas.microsoft.com/office/mac/drawingml/2011/main" xmlns:a14="http://schemas.microsoft.com/office/drawing/2010/main" xmlns:m="http://schemas.openxmlformats.org/officeDocument/2006/math" xmlns="" val="1"/>
+              <ma14:wrappingTextBoxFlag xmlns="" xmlns:m="http://schemas.openxmlformats.org/officeDocument/2006/math" xmlns:a14="http://schemas.microsoft.com/office/drawing/2010/main" xmlns:ma14="http://schemas.microsoft.com/office/mac/drawingml/2011/main" val="1"/>
             </a:ext>
           </a:extLst>
         </p:spPr>
@@ -35776,9 +35731,6 @@
   <p:clrMapOvr>
     <a:masterClrMapping/>
   </p:clrMapOvr>
-  <p:transition spd="slow">
-    <p:push/>
-  </p:transition>
 </p:sldLayout>
 </file>
 
@@ -36195,9 +36147,6 @@
   <p:clrMapOvr>
     <a:overrideClrMapping bg1="lt1" tx1="dk1" bg2="lt2" tx2="dk2" accent1="accent1" accent2="accent2" accent3="accent3" accent4="accent4" accent5="accent5" accent6="accent6" hlink="hlink" folHlink="folHlink"/>
   </p:clrMapOvr>
-  <p:transition spd="slow">
-    <p:push/>
-  </p:transition>
 </p:sldLayout>
 </file>
 
@@ -36927,9 +36876,6 @@
   <p:clrMapOvr>
     <a:overrideClrMapping bg1="dk1" tx1="lt1" bg2="dk2" tx2="lt2" accent1="accent1" accent2="accent2" accent3="accent3" accent4="accent4" accent5="accent5" accent6="accent6" hlink="hlink" folHlink="folHlink"/>
   </p:clrMapOvr>
-  <p:transition spd="slow">
-    <p:push/>
-  </p:transition>
 </p:sldLayout>
 </file>
 
@@ -37200,9 +37146,6 @@
   <p:clrMapOvr>
     <a:overrideClrMapping bg1="dk1" tx1="lt1" bg2="dk2" tx2="lt2" accent1="accent1" accent2="accent2" accent3="accent3" accent4="accent4" accent5="accent5" accent6="accent6" hlink="hlink" folHlink="folHlink"/>
   </p:clrMapOvr>
-  <p:transition spd="slow">
-    <p:push/>
-  </p:transition>
 </p:sldLayout>
 </file>
 
@@ -37469,9 +37412,6 @@
   <p:clrMapOvr>
     <a:masterClrMapping/>
   </p:clrMapOvr>
-  <p:transition spd="slow">
-    <p:push/>
-  </p:transition>
 </p:sldLayout>
 </file>
 
@@ -37736,9 +37676,6 @@
   <p:clrMapOvr>
     <a:masterClrMapping/>
   </p:clrMapOvr>
-  <p:transition spd="slow">
-    <p:push/>
-  </p:transition>
 </p:sldLayout>
 </file>
 
@@ -38016,9 +37953,6 @@
   <p:clrMapOvr>
     <a:overrideClrMapping bg1="dk1" tx1="lt1" bg2="dk2" tx2="lt2" accent1="accent1" accent2="accent2" accent3="accent3" accent4="accent4" accent5="accent5" accent6="accent6" hlink="hlink" folHlink="folHlink"/>
   </p:clrMapOvr>
-  <p:transition spd="slow">
-    <p:push/>
-  </p:transition>
 </p:sldLayout>
 </file>
 
@@ -38296,9 +38230,6 @@
   <p:clrMapOvr>
     <a:overrideClrMapping bg1="dk1" tx1="lt1" bg2="dk2" tx2="lt2" accent1="accent1" accent2="accent2" accent3="accent3" accent4="accent4" accent5="accent5" accent6="accent6" hlink="hlink" folHlink="folHlink"/>
   </p:clrMapOvr>
-  <p:transition spd="slow">
-    <p:push/>
-  </p:transition>
 </p:sldLayout>
 </file>
 
@@ -38572,9 +38503,6 @@
     <p:sldLayoutId id="2147483775" r:id="rId38"/>
     <p:sldLayoutId id="2147483749" r:id="rId39"/>
   </p:sldLayoutIdLst>
-  <p:transition spd="slow">
-    <p:push/>
-  </p:transition>
   <p:hf hdr="0"/>
   <p:txStyles>
     <p:titleStyle>
@@ -39157,7 +39085,7 @@
           <a:p>
             <a:fld id="{CBC48EC7-AF6A-48D3-8284-14BACBEBDD84}" type="datetimeFigureOut">
               <a:rPr lang="en-US" dirty="0"/>
-              <a:t>5/19/24</a:t>
+              <a:t>5/19/2024</a:t>
             </a:fld>
             <a:endParaRPr lang="en-US" dirty="0"/>
           </a:p>
@@ -39257,9 +39185,6 @@
     <p:sldLayoutId id="2147483796" r:id="rId2"/>
     <p:sldLayoutId id="2147483795" r:id="rId3"/>
   </p:sldLayoutIdLst>
-  <p:transition spd="slow">
-    <p:push/>
-  </p:transition>
   <p:hf hdr="0"/>
   <p:txStyles>
     <p:titleStyle>
@@ -40915,9 +40840,6 @@
   <p:clrMapOvr>
     <a:overrideClrMapping bg1="lt1" tx1="dk1" bg2="lt2" tx2="dk2" accent1="accent1" accent2="accent2" accent3="accent3" accent4="accent4" accent5="accent5" accent6="accent6" hlink="hlink" folHlink="folHlink"/>
   </p:clrMapOvr>
-  <p:transition spd="slow" advTm="10614">
-    <p:push/>
-  </p:transition>
 </p:sld>
 </file>
 
@@ -41135,9 +41057,6 @@
   <p:clrMapOvr>
     <a:masterClrMapping/>
   </p:clrMapOvr>
-  <p:transition spd="slow" advTm="47992">
-    <p:push/>
-  </p:transition>
 </p:sld>
 </file>
 
@@ -41298,9 +41217,6 @@
   <p:clrMapOvr>
     <a:masterClrMapping/>
   </p:clrMapOvr>
-  <p:transition spd="slow" advTm="47992">
-    <p:push/>
-  </p:transition>
 </p:sld>
 </file>
 
@@ -42484,9 +42400,6 @@
   <p:clrMapOvr>
     <a:masterClrMapping/>
   </p:clrMapOvr>
-  <p:transition spd="slow" advTm="15009">
-    <p:push/>
-  </p:transition>
 </p:sld>
 </file>
 
@@ -42753,9 +42666,6 @@
   <p:clrMapOvr>
     <a:masterClrMapping/>
   </p:clrMapOvr>
-  <p:transition spd="slow" advTm="47992">
-    <p:push/>
-  </p:transition>
 </p:sld>
 </file>
 
@@ -43993,45 +43903,6 @@
           </a:p>
         </p:txBody>
       </p:sp>
-      <p:pic>
-        <p:nvPicPr>
-          <p:cNvPr id="162" name="Graphic 161" descr="Scatterplot outline">
-            <a:extLst>
-              <a:ext uri="{FF2B5EF4-FFF2-40B4-BE49-F238E27FC236}">
-                <a16:creationId xmlns:a16="http://schemas.microsoft.com/office/drawing/2014/main" id="{8DA94C4E-F777-253C-C5EA-C23419EB143A}"/>
-              </a:ext>
-            </a:extLst>
-          </p:cNvPr>
-          <p:cNvPicPr>
-            <a:picLocks noChangeAspect="1"/>
-          </p:cNvPicPr>
-          <p:nvPr/>
-        </p:nvPicPr>
-        <p:blipFill>
-          <a:blip r:embed="rId14">
-            <a:extLst>
-              <a:ext uri="{28A0092B-C50C-407E-A947-70E740481C1C}">
-                <a14:useLocalDpi xmlns:a14="http://schemas.microsoft.com/office/drawing/2010/main" val="0"/>
-              </a:ext>
-              <a:ext uri="{96DAC541-7B7A-43D3-8B79-37D633B846F1}">
-                <asvg:svgBlip xmlns:asvg="http://schemas.microsoft.com/office/drawing/2016/SVG/main" r:embed="rId15"/>
-              </a:ext>
-            </a:extLst>
-          </a:blip>
-          <a:stretch>
-            <a:fillRect/>
-          </a:stretch>
-        </p:blipFill>
-        <p:spPr>
-          <a:xfrm>
-            <a:off x="8381183" y="3743476"/>
-            <a:ext cx="648959" cy="634169"/>
-          </a:xfrm>
-          <a:prstGeom prst="rect">
-            <a:avLst/>
-          </a:prstGeom>
-        </p:spPr>
-      </p:pic>
       <p:cxnSp>
         <p:nvCxnSpPr>
           <p:cNvPr id="164" name="Straight Arrow Connector 163">
@@ -44139,13 +44010,13 @@
           <p:nvPr/>
         </p:nvPicPr>
         <p:blipFill>
-          <a:blip r:embed="rId16">
+          <a:blip r:embed="rId14">
             <a:extLst>
               <a:ext uri="{28A0092B-C50C-407E-A947-70E740481C1C}">
                 <a14:useLocalDpi xmlns:a14="http://schemas.microsoft.com/office/drawing/2010/main" val="0"/>
               </a:ext>
               <a:ext uri="{96DAC541-7B7A-43D3-8B79-37D633B846F1}">
-                <asvg:svgBlip xmlns:asvg="http://schemas.microsoft.com/office/drawing/2016/SVG/main" r:embed="rId17"/>
+                <asvg:svgBlip xmlns:asvg="http://schemas.microsoft.com/office/drawing/2016/SVG/main" r:embed="rId15"/>
               </a:ext>
             </a:extLst>
           </a:blip>
@@ -44178,13 +44049,13 @@
           <p:nvPr/>
         </p:nvPicPr>
         <p:blipFill>
-          <a:blip r:embed="rId18">
+          <a:blip r:embed="rId16">
             <a:extLst>
               <a:ext uri="{28A0092B-C50C-407E-A947-70E740481C1C}">
                 <a14:useLocalDpi xmlns:a14="http://schemas.microsoft.com/office/drawing/2010/main" val="0"/>
               </a:ext>
               <a:ext uri="{96DAC541-7B7A-43D3-8B79-37D633B846F1}">
-                <asvg:svgBlip xmlns:asvg="http://schemas.microsoft.com/office/drawing/2016/SVG/main" r:embed="rId19"/>
+                <asvg:svgBlip xmlns:asvg="http://schemas.microsoft.com/office/drawing/2016/SVG/main" r:embed="rId17"/>
               </a:ext>
             </a:extLst>
           </a:blip>
@@ -44451,13 +44322,13 @@
           <p:nvPr/>
         </p:nvPicPr>
         <p:blipFill>
-          <a:blip r:embed="rId14">
+          <a:blip r:embed="rId18">
             <a:extLst>
               <a:ext uri="{28A0092B-C50C-407E-A947-70E740481C1C}">
                 <a14:useLocalDpi xmlns:a14="http://schemas.microsoft.com/office/drawing/2010/main" val="0"/>
               </a:ext>
               <a:ext uri="{96DAC541-7B7A-43D3-8B79-37D633B846F1}">
-                <asvg:svgBlip xmlns:asvg="http://schemas.microsoft.com/office/drawing/2016/SVG/main" r:embed="rId15"/>
+                <asvg:svgBlip xmlns:asvg="http://schemas.microsoft.com/office/drawing/2016/SVG/main" r:embed="rId19"/>
               </a:ext>
             </a:extLst>
           </a:blip>
@@ -44490,9 +44361,6 @@
   <p:clrMapOvr>
     <a:masterClrMapping/>
   </p:clrMapOvr>
-  <p:transition spd="slow" advTm="15009">
-    <p:push/>
-  </p:transition>
 </p:sld>
 </file>
 
@@ -44682,9 +44550,6 @@
   <p:clrMapOvr>
     <a:masterClrMapping/>
   </p:clrMapOvr>
-  <p:transition spd="slow" advTm="47992">
-    <p:push/>
-  </p:transition>
 </p:sld>
 </file>
 
@@ -44915,9 +44780,6 @@
   <p:clrMapOvr>
     <a:masterClrMapping/>
   </p:clrMapOvr>
-  <p:transition spd="slow" advTm="47992">
-    <p:push/>
-  </p:transition>
 </p:sld>
 </file>
 
@@ -45503,9 +45365,6 @@
   <p:clrMapOvr>
     <a:masterClrMapping/>
   </p:clrMapOvr>
-  <p:transition spd="slow" advTm="47992">
-    <p:push/>
-  </p:transition>
 </p:sld>
 </file>
 
@@ -45693,9 +45552,6 @@
   <p:clrMapOvr>
     <a:masterClrMapping/>
   </p:clrMapOvr>
-  <p:transition spd="slow" advTm="47992">
-    <p:push/>
-  </p:transition>
 </p:sld>
 </file>
 
@@ -45902,9 +45758,6 @@
   <p:clrMapOvr>
     <a:masterClrMapping/>
   </p:clrMapOvr>
-  <p:transition spd="slow" advTm="47992">
-    <p:push/>
-  </p:transition>
 </p:sld>
 </file>
 
@@ -47410,61 +47263,61 @@
 </file>
 
 <file path=customXml/item1.xml><?xml version="1.0" encoding="utf-8"?>
+<TemplafySlideTemplateConfiguration><![CDATA[{"slideVersion":1,"isValidatorEnabled":false,"isLocked":false,"elementsMetadata":[],"slideId":"638048769900279182","enableDocumentContentUpdater":false,"version":"2.0"}]]></TemplafySlideTemplateConfiguration>
+</file>
+
+<file path=customXml/item2.xml><?xml version="1.0" encoding="utf-8"?>
 <TemplafySlideFormConfiguration><![CDATA[{"formFields":[],"formDataEntries":[]}]]></TemplafySlideFormConfiguration>
 </file>
 
-<file path=customXml/item2.xml><?xml version="1.0" encoding="utf-8"?>
+<file path=customXml/item3.xml><?xml version="1.0" encoding="utf-8"?>
+<TemplafyTemplateConfiguration><![CDATA[{"elementsMetadata":[],"transformationConfigurations":[],"templateName":"Template 2024","templateDescription":"","enableDocumentContentUpdater":false,"version":"2.0"}]]></TemplafyTemplateConfiguration>
+</file>
+
+<file path=customXml/item4.xml><?xml version="1.0" encoding="utf-8"?>
+<TemplafyFormConfiguration><![CDATA[{"formFields":[],"formDataEntries":[]}]]></TemplafyFormConfiguration>
+</file>
+
+<file path=customXml/item5.xml><?xml version="1.0" encoding="utf-8"?>
 <TemplafySlideTemplateConfiguration><![CDATA[{"slideVersion":1,"isValidatorEnabled":false,"isLocked":false,"elementsMetadata":[],"slideId":"638048769900279182","enableDocumentContentUpdater":false,"version":"2.0"}]]></TemplafySlideTemplateConfiguration>
 </file>
 
-<file path=customXml/item3.xml><?xml version="1.0" encoding="utf-8"?>
-<TemplafyFormConfiguration><![CDATA[{"formFields":[],"formDataEntries":[]}]]></TemplafyFormConfiguration>
-</file>
-
-<file path=customXml/item4.xml><?xml version="1.0" encoding="utf-8"?>
-<TemplafyTemplateConfiguration><![CDATA[{"elementsMetadata":[],"transformationConfigurations":[],"templateName":"Template 2024","templateDescription":"","enableDocumentContentUpdater":false,"version":"2.0"}]]></TemplafyTemplateConfiguration>
-</file>
-
-<file path=customXml/item5.xml><?xml version="1.0" encoding="utf-8"?>
+<file path=customXml/item6.xml><?xml version="1.0" encoding="utf-8"?>
 <TemplafySlideFormConfiguration><![CDATA[{"formFields":[],"formDataEntries":[]}]]></TemplafySlideFormConfiguration>
 </file>
 
-<file path=customXml/item6.xml><?xml version="1.0" encoding="utf-8"?>
-<TemplafySlideTemplateConfiguration><![CDATA[{"slideVersion":1,"isValidatorEnabled":false,"isLocked":false,"elementsMetadata":[],"slideId":"638048769900279182","enableDocumentContentUpdater":false,"version":"2.0"}]]></TemplafySlideTemplateConfiguration>
-</file>
-
 <file path=customXml/itemProps1.xml><?xml version="1.0" encoding="utf-8"?>
-<ds:datastoreItem xmlns:ds="http://schemas.openxmlformats.org/officeDocument/2006/customXml" ds:itemID="{318FE172-2E4A-41F3-98F3-1CD8CCD9375A}">
+<ds:datastoreItem xmlns:ds="http://schemas.openxmlformats.org/officeDocument/2006/customXml" ds:itemID="{4427119E-0EC6-45F3-B5C4-5D645139FD8A}">
   <ds:schemaRefs/>
 </ds:datastoreItem>
 </file>
 
 <file path=customXml/itemProps2.xml><?xml version="1.0" encoding="utf-8"?>
+<ds:datastoreItem xmlns:ds="http://schemas.openxmlformats.org/officeDocument/2006/customXml" ds:itemID="{B779C644-68B7-4164-9D25-5094A90807DA}">
+  <ds:schemaRefs/>
+</ds:datastoreItem>
+</file>
+
+<file path=customXml/itemProps3.xml><?xml version="1.0" encoding="utf-8"?>
+<ds:datastoreItem xmlns:ds="http://schemas.openxmlformats.org/officeDocument/2006/customXml" ds:itemID="{43877E11-121F-45E2-A0FE-16DFA988BBD5}">
+  <ds:schemaRefs/>
+</ds:datastoreItem>
+</file>
+
+<file path=customXml/itemProps4.xml><?xml version="1.0" encoding="utf-8"?>
+<ds:datastoreItem xmlns:ds="http://schemas.openxmlformats.org/officeDocument/2006/customXml" ds:itemID="{9A03A13C-D5E3-49F8-B37D-AFA024345652}">
+  <ds:schemaRefs/>
+</ds:datastoreItem>
+</file>
+
+<file path=customXml/itemProps5.xml><?xml version="1.0" encoding="utf-8"?>
 <ds:datastoreItem xmlns:ds="http://schemas.openxmlformats.org/officeDocument/2006/customXml" ds:itemID="{31A6E273-308C-4E61-93A6-3725B57DDBD2}">
   <ds:schemaRefs/>
 </ds:datastoreItem>
 </file>
 
-<file path=customXml/itemProps3.xml><?xml version="1.0" encoding="utf-8"?>
-<ds:datastoreItem xmlns:ds="http://schemas.openxmlformats.org/officeDocument/2006/customXml" ds:itemID="{9A03A13C-D5E3-49F8-B37D-AFA024345652}">
-  <ds:schemaRefs/>
-</ds:datastoreItem>
-</file>
-
-<file path=customXml/itemProps4.xml><?xml version="1.0" encoding="utf-8"?>
-<ds:datastoreItem xmlns:ds="http://schemas.openxmlformats.org/officeDocument/2006/customXml" ds:itemID="{43877E11-121F-45E2-A0FE-16DFA988BBD5}">
-  <ds:schemaRefs/>
-</ds:datastoreItem>
-</file>
-
-<file path=customXml/itemProps5.xml><?xml version="1.0" encoding="utf-8"?>
-<ds:datastoreItem xmlns:ds="http://schemas.openxmlformats.org/officeDocument/2006/customXml" ds:itemID="{B779C644-68B7-4164-9D25-5094A90807DA}">
-  <ds:schemaRefs/>
-</ds:datastoreItem>
-</file>
-
 <file path=customXml/itemProps6.xml><?xml version="1.0" encoding="utf-8"?>
-<ds:datastoreItem xmlns:ds="http://schemas.openxmlformats.org/officeDocument/2006/customXml" ds:itemID="{4427119E-0EC6-45F3-B5C4-5D645139FD8A}">
+<ds:datastoreItem xmlns:ds="http://schemas.openxmlformats.org/officeDocument/2006/customXml" ds:itemID="{318FE172-2E4A-41F3-98F3-1CD8CCD9375A}">
   <ds:schemaRefs/>
 </ds:datastoreItem>
 </file>
</xml_diff>